<commit_message>
Modify Bao cao + Slide. Add tool analyzing 16-Puzzle
</commit_message>
<xml_diff>
--- a/Slide IT4040.pptx
+++ b/Slide IT4040.pptx
@@ -283,7 +283,6 @@
             <c:showLeaderLines val="0"/>
             <c:extLst>
               <c:ext xmlns:c15="http://schemas.microsoft.com/office/drawing/2012/chart" uri="{CE6537A1-D6FC-4f65-9D91-7224C49458BB}">
-                <c15:layout/>
                 <c15:showLeaderLines val="1"/>
                 <c15:leaderLines>
                   <c:spPr>
@@ -419,7 +418,6 @@
             <c:showLeaderLines val="0"/>
             <c:extLst>
               <c:ext xmlns:c15="http://schemas.microsoft.com/office/drawing/2012/chart" uri="{CE6537A1-D6FC-4f65-9D91-7224C49458BB}">
-                <c15:layout/>
                 <c15:showLeaderLines val="1"/>
                 <c15:leaderLines>
                   <c:spPr>
@@ -622,7 +620,6 @@
     </c:plotArea>
     <c:legend>
       <c:legendPos val="b"/>
-      <c:layout/>
       <c:overlay val="0"/>
       <c:spPr>
         <a:noFill/>
@@ -719,7 +716,6 @@
           </a:p>
         </c:rich>
       </c:tx>
-      <c:layout/>
       <c:overlay val="0"/>
       <c:spPr>
         <a:noFill/>
@@ -830,7 +826,6 @@
             <c:showLeaderLines val="0"/>
             <c:extLst>
               <c:ext xmlns:c15="http://schemas.microsoft.com/office/drawing/2012/chart" uri="{CE6537A1-D6FC-4f65-9D91-7224C49458BB}">
-                <c15:layout/>
                 <c15:showLeaderLines val="1"/>
                 <c15:leaderLines>
                   <c:spPr>
@@ -966,7 +961,6 @@
             <c:showLeaderLines val="0"/>
             <c:extLst>
               <c:ext xmlns:c15="http://schemas.microsoft.com/office/drawing/2012/chart" uri="{CE6537A1-D6FC-4f65-9D91-7224C49458BB}">
-                <c15:layout/>
                 <c15:showLeaderLines val="1"/>
                 <c15:leaderLines>
                   <c:spPr>
@@ -1232,7 +1226,6 @@
     </c:plotArea>
     <c:legend>
       <c:legendPos val="b"/>
-      <c:layout/>
       <c:overlay val="0"/>
       <c:spPr>
         <a:noFill/>
@@ -1329,7 +1322,6 @@
           </a:p>
         </c:rich>
       </c:tx>
-      <c:layout/>
       <c:overlay val="0"/>
       <c:spPr>
         <a:noFill/>
@@ -1430,7 +1422,6 @@
             <c:showLeaderLines val="0"/>
             <c:extLst>
               <c:ext xmlns:c15="http://schemas.microsoft.com/office/drawing/2012/chart" uri="{CE6537A1-D6FC-4f65-9D91-7224C49458BB}">
-                <c15:layout/>
                 <c15:showLeaderLines val="1"/>
                 <c15:leaderLines>
                   <c:spPr>
@@ -1566,7 +1557,6 @@
             <c:showLeaderLines val="0"/>
             <c:extLst>
               <c:ext xmlns:c15="http://schemas.microsoft.com/office/drawing/2012/chart" uri="{CE6537A1-D6FC-4f65-9D91-7224C49458BB}">
-                <c15:layout/>
                 <c15:showLeaderLines val="1"/>
                 <c15:leaderLines>
                   <c:spPr>
@@ -1750,7 +1740,6 @@
               </a:p>
             </c:rich>
           </c:tx>
-          <c:layout/>
           <c:overlay val="0"/>
           <c:spPr>
             <a:noFill/>
@@ -1825,7 +1814,6 @@
     </c:plotArea>
     <c:legend>
       <c:legendPos val="b"/>
-      <c:layout/>
       <c:overlay val="0"/>
       <c:spPr>
         <a:noFill/>
@@ -1922,7 +1910,6 @@
           </a:p>
         </c:rich>
       </c:tx>
-      <c:layout/>
       <c:overlay val="0"/>
       <c:spPr>
         <a:noFill/>
@@ -2023,7 +2010,6 @@
             <c:showLeaderLines val="0"/>
             <c:extLst>
               <c:ext xmlns:c15="http://schemas.microsoft.com/office/drawing/2012/chart" uri="{CE6537A1-D6FC-4f65-9D91-7224C49458BB}">
-                <c15:layout/>
                 <c15:showLeaderLines val="1"/>
                 <c15:leaderLines>
                   <c:spPr>
@@ -2159,7 +2145,6 @@
             <c:showLeaderLines val="0"/>
             <c:extLst>
               <c:ext xmlns:c15="http://schemas.microsoft.com/office/drawing/2012/chart" uri="{CE6537A1-D6FC-4f65-9D91-7224C49458BB}">
-                <c15:layout/>
                 <c15:showLeaderLines val="1"/>
                 <c15:leaderLines>
                   <c:spPr>
@@ -2342,7 +2327,6 @@
               </a:p>
             </c:rich>
           </c:tx>
-          <c:layout/>
           <c:overlay val="0"/>
           <c:spPr>
             <a:noFill/>
@@ -2417,7 +2401,6 @@
     </c:plotArea>
     <c:legend>
       <c:legendPos val="b"/>
-      <c:layout/>
       <c:overlay val="0"/>
       <c:spPr>
         <a:noFill/>
@@ -2514,7 +2497,6 @@
           </a:p>
         </c:rich>
       </c:tx>
-      <c:layout/>
       <c:overlay val="0"/>
       <c:spPr>
         <a:noFill/>
@@ -2615,7 +2597,6 @@
             <c:showLeaderLines val="0"/>
             <c:extLst>
               <c:ext xmlns:c15="http://schemas.microsoft.com/office/drawing/2012/chart" uri="{CE6537A1-D6FC-4f65-9D91-7224C49458BB}">
-                <c15:layout/>
                 <c15:showLeaderLines val="1"/>
                 <c15:leaderLines>
                   <c:spPr>
@@ -2751,7 +2732,6 @@
             <c:showLeaderLines val="0"/>
             <c:extLst>
               <c:ext xmlns:c15="http://schemas.microsoft.com/office/drawing/2012/chart" uri="{CE6537A1-D6FC-4f65-9D91-7224C49458BB}">
-                <c15:layout/>
                 <c15:showLeaderLines val="1"/>
                 <c15:leaderLines>
                   <c:spPr>
@@ -2935,7 +2915,6 @@
               </a:p>
             </c:rich>
           </c:tx>
-          <c:layout/>
           <c:overlay val="0"/>
           <c:spPr>
             <a:noFill/>
@@ -3010,7 +2989,6 @@
     </c:plotArea>
     <c:legend>
       <c:legendPos val="b"/>
-      <c:layout/>
       <c:overlay val="0"/>
       <c:spPr>
         <a:noFill/>
@@ -3107,7 +3085,6 @@
           </a:p>
         </c:rich>
       </c:tx>
-      <c:layout/>
       <c:overlay val="0"/>
       <c:spPr>
         <a:noFill/>
@@ -3208,7 +3185,6 @@
             <c:showLeaderLines val="0"/>
             <c:extLst>
               <c:ext xmlns:c15="http://schemas.microsoft.com/office/drawing/2012/chart" uri="{CE6537A1-D6FC-4f65-9D91-7224C49458BB}">
-                <c15:layout/>
                 <c15:showLeaderLines val="1"/>
                 <c15:leaderLines>
                   <c:spPr>
@@ -3344,7 +3320,6 @@
             <c:showLeaderLines val="0"/>
             <c:extLst>
               <c:ext xmlns:c15="http://schemas.microsoft.com/office/drawing/2012/chart" uri="{CE6537A1-D6FC-4f65-9D91-7224C49458BB}">
-                <c15:layout/>
                 <c15:showLeaderLines val="1"/>
                 <c15:leaderLines>
                   <c:spPr>
@@ -3528,7 +3503,6 @@
               </a:p>
             </c:rich>
           </c:tx>
-          <c:layout/>
           <c:overlay val="0"/>
           <c:spPr>
             <a:noFill/>
@@ -3603,7 +3577,6 @@
     </c:plotArea>
     <c:legend>
       <c:legendPos val="b"/>
-      <c:layout/>
       <c:overlay val="0"/>
       <c:spPr>
         <a:noFill/>
@@ -14176,13 +14149,13 @@
   <p:clrMapOvr>
     <a:masterClrMapping/>
   </p:clrMapOvr>
-  <mc:AlternateContent xmlns:mc="http://schemas.openxmlformats.org/markup-compatibility/2006">
-    <mc:Choice xmlns:p15="http://schemas.microsoft.com/office/powerpoint/2012/main" Requires="p15">
+  <mc:AlternateContent xmlns:mc="http://schemas.openxmlformats.org/markup-compatibility/2006" xmlns:p15="http://schemas.microsoft.com/office/powerpoint/2012/main">
+    <mc:Choice Requires="p15">
       <p:transition spd="med">
         <p15:prstTrans prst="drape"/>
       </p:transition>
     </mc:Choice>
-    <mc:Fallback>
+    <mc:Fallback xmlns="">
       <p:transition spd="med">
         <p:fade/>
       </p:transition>
@@ -14398,13 +14371,13 @@
   <p:clrMapOvr>
     <a:masterClrMapping/>
   </p:clrMapOvr>
-  <mc:AlternateContent xmlns:mc="http://schemas.openxmlformats.org/markup-compatibility/2006">
-    <mc:Choice xmlns:p15="http://schemas.microsoft.com/office/powerpoint/2012/main" Requires="p15">
+  <mc:AlternateContent xmlns:mc="http://schemas.openxmlformats.org/markup-compatibility/2006" xmlns:p15="http://schemas.microsoft.com/office/powerpoint/2012/main">
+    <mc:Choice Requires="p15">
       <p:transition spd="med">
         <p15:prstTrans prst="drape"/>
       </p:transition>
     </mc:Choice>
-    <mc:Fallback>
+    <mc:Fallback xmlns="">
       <p:transition spd="med">
         <p:fade/>
       </p:transition>
@@ -14568,19 +14541,7 @@
               <a:rPr lang="en-US" b="1" smtClean="0">
                 <a:latin typeface="Cambria" panose="02040503050406030204" pitchFamily="18" charset="0"/>
               </a:rPr>
-              <a:t>Distance plus 2 for each Linear </a:t>
-            </a:r>
-            <a:r>
-              <a:rPr lang="en-US" b="1" smtClean="0">
-                <a:latin typeface="Cambria" panose="02040503050406030204" pitchFamily="18" charset="0"/>
-              </a:rPr>
-              <a:t>Conflict </a:t>
-            </a:r>
-            <a:r>
-              <a:rPr lang="en-US" b="1" smtClean="0">
-                <a:latin typeface="Cambria" panose="02040503050406030204" pitchFamily="18" charset="0"/>
-              </a:rPr>
-              <a:t>pair</a:t>
+              <a:t>Distance plus 2 for each Linear Conflict pair</a:t>
             </a:r>
           </a:p>
         </p:txBody>
@@ -14628,13 +14589,13 @@
   <p:clrMapOvr>
     <a:masterClrMapping/>
   </p:clrMapOvr>
-  <mc:AlternateContent xmlns:mc="http://schemas.openxmlformats.org/markup-compatibility/2006">
-    <mc:Choice xmlns:p15="http://schemas.microsoft.com/office/powerpoint/2012/main" Requires="p15">
+  <mc:AlternateContent xmlns:mc="http://schemas.openxmlformats.org/markup-compatibility/2006" xmlns:p15="http://schemas.microsoft.com/office/powerpoint/2012/main">
+    <mc:Choice Requires="p15">
       <p:transition spd="med">
         <p15:prstTrans prst="drape"/>
       </p:transition>
     </mc:Choice>
-    <mc:Fallback>
+    <mc:Fallback xmlns="">
       <p:transition spd="med">
         <p:fade/>
       </p:transition>
@@ -14837,13 +14798,13 @@
   <p:clrMapOvr>
     <a:masterClrMapping/>
   </p:clrMapOvr>
-  <mc:AlternateContent xmlns:mc="http://schemas.openxmlformats.org/markup-compatibility/2006">
-    <mc:Choice xmlns:p15="http://schemas.microsoft.com/office/powerpoint/2012/main" Requires="p15">
+  <mc:AlternateContent xmlns:mc="http://schemas.openxmlformats.org/markup-compatibility/2006" xmlns:p15="http://schemas.microsoft.com/office/powerpoint/2012/main">
+    <mc:Choice Requires="p15">
       <p:transition spd="med">
         <p15:prstTrans prst="drape"/>
       </p:transition>
     </mc:Choice>
-    <mc:Fallback>
+    <mc:Fallback xmlns="">
       <p:transition spd="med">
         <p:fade/>
       </p:transition>
@@ -14986,13 +14947,13 @@
   <p:clrMapOvr>
     <a:masterClrMapping/>
   </p:clrMapOvr>
-  <mc:AlternateContent xmlns:mc="http://schemas.openxmlformats.org/markup-compatibility/2006">
-    <mc:Choice xmlns:p15="http://schemas.microsoft.com/office/powerpoint/2012/main" Requires="p15">
+  <mc:AlternateContent xmlns:mc="http://schemas.openxmlformats.org/markup-compatibility/2006" xmlns:p15="http://schemas.microsoft.com/office/powerpoint/2012/main">
+    <mc:Choice Requires="p15">
       <p:transition spd="med">
         <p15:prstTrans prst="drape"/>
       </p:transition>
     </mc:Choice>
-    <mc:Fallback>
+    <mc:Fallback xmlns="">
       <p:transition spd="med">
         <p:fade/>
       </p:transition>
@@ -15063,8 +15024,8 @@
           </a:p>
         </p:txBody>
       </p:sp>
-      <mc:AlternateContent xmlns:mc="http://schemas.openxmlformats.org/markup-compatibility/2006">
-        <mc:Choice xmlns:a14="http://schemas.microsoft.com/office/drawing/2010/main" Requires="a14">
+      <mc:AlternateContent xmlns:mc="http://schemas.openxmlformats.org/markup-compatibility/2006" xmlns:a14="http://schemas.microsoft.com/office/drawing/2010/main">
+        <mc:Choice Requires="a14">
           <p:sp>
             <p:nvSpPr>
               <p:cNvPr id="3" name="Content Placeholder 2"/>
@@ -15667,7 +15628,7 @@
             </p:txBody>
           </p:sp>
         </mc:Choice>
-        <mc:Fallback>
+        <mc:Fallback xmlns="">
           <p:sp>
             <p:nvSpPr>
               <p:cNvPr id="3" name="Content Placeholder 2"/>
@@ -15715,13 +15676,13 @@
   <p:clrMapOvr>
     <a:masterClrMapping/>
   </p:clrMapOvr>
-  <mc:AlternateContent xmlns:mc="http://schemas.openxmlformats.org/markup-compatibility/2006">
-    <mc:Choice xmlns:p15="http://schemas.microsoft.com/office/powerpoint/2012/main" Requires="p15">
+  <mc:AlternateContent xmlns:mc="http://schemas.openxmlformats.org/markup-compatibility/2006" xmlns:p15="http://schemas.microsoft.com/office/powerpoint/2012/main">
+    <mc:Choice Requires="p15">
       <p:transition spd="med">
         <p15:prstTrans prst="drape"/>
       </p:transition>
     </mc:Choice>
-    <mc:Fallback>
+    <mc:Fallback xmlns="">
       <p:transition spd="med">
         <p:fade/>
       </p:transition>
@@ -15870,14 +15831,7 @@
                 <a:latin typeface="Cambria Math" panose="02040503050406030204" pitchFamily="18" charset="0"/>
                 <a:ea typeface="Cambria Math" panose="02040503050406030204" pitchFamily="18" charset="0"/>
               </a:rPr>
-              <a:t>P[B[0]]</a:t>
-            </a:r>
-            <a:r>
-              <a:rPr lang="en-US" sz="2400" smtClean="0">
-                <a:latin typeface="Cambria Math" panose="02040503050406030204" pitchFamily="18" charset="0"/>
-                <a:ea typeface="Cambria Math" panose="02040503050406030204" pitchFamily="18" charset="0"/>
-              </a:rPr>
-              <a:t> </a:t>
+              <a:t>P[B[0]] </a:t>
             </a:r>
             <a:r>
               <a:rPr lang="en-US" sz="2400">
@@ -15929,13 +15883,13 @@
   <p:clrMapOvr>
     <a:masterClrMapping/>
   </p:clrMapOvr>
-  <mc:AlternateContent xmlns:mc="http://schemas.openxmlformats.org/markup-compatibility/2006">
-    <mc:Choice xmlns:p15="http://schemas.microsoft.com/office/powerpoint/2012/main" Requires="p15">
+  <mc:AlternateContent xmlns:mc="http://schemas.openxmlformats.org/markup-compatibility/2006" xmlns:p15="http://schemas.microsoft.com/office/powerpoint/2012/main">
+    <mc:Choice Requires="p15">
       <p:transition spd="med">
         <p15:prstTrans prst="drape"/>
       </p:transition>
     </mc:Choice>
-    <mc:Fallback>
+    <mc:Fallback xmlns="">
       <p:transition spd="med">
         <p:fade/>
       </p:transition>
@@ -15993,8 +15947,8 @@
           </a:p>
         </p:txBody>
       </p:sp>
-      <mc:AlternateContent xmlns:mc="http://schemas.openxmlformats.org/markup-compatibility/2006">
-        <mc:Choice xmlns:a14="http://schemas.microsoft.com/office/drawing/2010/main" Requires="a14">
+      <mc:AlternateContent xmlns:mc="http://schemas.openxmlformats.org/markup-compatibility/2006" xmlns:a14="http://schemas.microsoft.com/office/drawing/2010/main">
+        <mc:Choice Requires="a14">
           <p:sp>
             <p:nvSpPr>
               <p:cNvPr id="3" name="Content Placeholder 2"/>
@@ -16005,7 +15959,12 @@
                 <p:ph idx="1"/>
               </p:nvPr>
             </p:nvSpPr>
-            <p:spPr/>
+            <p:spPr>
+              <a:xfrm>
+                <a:off x="1103312" y="2052918"/>
+                <a:ext cx="7604083" cy="4195481"/>
+              </a:xfrm>
+            </p:spPr>
             <p:txBody>
               <a:bodyPr>
                 <a:normAutofit lnSpcReduction="10000"/>
@@ -16338,7 +16297,7 @@
             </p:txBody>
           </p:sp>
         </mc:Choice>
-        <mc:Fallback>
+        <mc:Fallback xmlns="">
           <p:sp>
             <p:nvSpPr>
               <p:cNvPr id="3" name="Content Placeholder 2"/>
@@ -16350,10 +16309,14 @@
               </p:nvPr>
             </p:nvSpPr>
             <p:spPr>
+              <a:xfrm>
+                <a:off x="1103312" y="2052918"/>
+                <a:ext cx="7604083" cy="4195481"/>
+              </a:xfrm>
               <a:blipFill>
                 <a:blip r:embed="rId2"/>
                 <a:stretch>
-                  <a:fillRect l="-1431" t="-2616" b="-291"/>
+                  <a:fillRect l="-1684" t="-2616" b="-291"/>
                 </a:stretch>
               </a:blipFill>
             </p:spPr>
@@ -16396,6 +16359,48 @@
           </a:prstGeom>
         </p:spPr>
       </p:pic>
+      <p:sp>
+        <p:nvSpPr>
+          <p:cNvPr id="5" name="TextBox 4"/>
+          <p:cNvSpPr txBox="1"/>
+          <p:nvPr/>
+        </p:nvSpPr>
+        <p:spPr>
+          <a:xfrm>
+            <a:off x="8707395" y="5239265"/>
+            <a:ext cx="3278659" cy="830997"/>
+          </a:xfrm>
+          <a:prstGeom prst="rect">
+            <a:avLst/>
+          </a:prstGeom>
+          <a:noFill/>
+        </p:spPr>
+        <p:txBody>
+          <a:bodyPr wrap="square" rtlCol="0">
+            <a:spAutoFit/>
+          </a:bodyPr>
+          <a:lstStyle/>
+          <a:p>
+            <a:r>
+              <a:rPr lang="en-US" sz="2400" smtClean="0">
+                <a:latin typeface="Cambria" panose="02040503050406030204" pitchFamily="18" charset="0"/>
+              </a:rPr>
+              <a:t>H = 77.</a:t>
+            </a:r>
+          </a:p>
+          <a:p>
+            <a:r>
+              <a:rPr lang="en-US" sz="2400" smtClean="0">
+                <a:latin typeface="Cambria" panose="02040503050406030204" pitchFamily="18" charset="0"/>
+              </a:rPr>
+              <a:t>Chi phí thực tế = 68</a:t>
+            </a:r>
+            <a:endParaRPr lang="en-US" sz="2400">
+              <a:latin typeface="Cambria" panose="02040503050406030204" pitchFamily="18" charset="0"/>
+            </a:endParaRPr>
+          </a:p>
+        </p:txBody>
+      </p:sp>
     </p:spTree>
     <p:extLst>
       <p:ext uri="{BB962C8B-B14F-4D97-AF65-F5344CB8AC3E}">
@@ -16406,13 +16411,13 @@
   <p:clrMapOvr>
     <a:masterClrMapping/>
   </p:clrMapOvr>
-  <mc:AlternateContent xmlns:mc="http://schemas.openxmlformats.org/markup-compatibility/2006">
-    <mc:Choice xmlns:p15="http://schemas.microsoft.com/office/powerpoint/2012/main" Requires="p15">
+  <mc:AlternateContent xmlns:mc="http://schemas.openxmlformats.org/markup-compatibility/2006" xmlns:p15="http://schemas.microsoft.com/office/powerpoint/2012/main">
+    <mc:Choice Requires="p15">
       <p:transition spd="med">
         <p15:prstTrans prst="drape"/>
       </p:transition>
     </mc:Choice>
-    <mc:Fallback>
+    <mc:Fallback xmlns="">
       <p:transition spd="med">
         <p:fade/>
       </p:transition>
@@ -16511,13 +16516,13 @@
   <p:clrMapOvr>
     <a:masterClrMapping/>
   </p:clrMapOvr>
-  <mc:AlternateContent xmlns:mc="http://schemas.openxmlformats.org/markup-compatibility/2006">
-    <mc:Choice xmlns:p15="http://schemas.microsoft.com/office/powerpoint/2012/main" Requires="p15">
+  <mc:AlternateContent xmlns:mc="http://schemas.openxmlformats.org/markup-compatibility/2006" xmlns:p15="http://schemas.microsoft.com/office/powerpoint/2012/main">
+    <mc:Choice Requires="p15">
       <p:transition spd="med">
         <p15:prstTrans prst="drape"/>
       </p:transition>
     </mc:Choice>
-    <mc:Fallback>
+    <mc:Fallback xmlns="">
       <p:transition spd="med">
         <p:fade/>
       </p:transition>
@@ -16611,13 +16616,13 @@
   <p:clrMapOvr>
     <a:masterClrMapping/>
   </p:clrMapOvr>
-  <mc:AlternateContent xmlns:mc="http://schemas.openxmlformats.org/markup-compatibility/2006">
-    <mc:Choice xmlns:p15="http://schemas.microsoft.com/office/powerpoint/2012/main" Requires="p15">
+  <mc:AlternateContent xmlns:mc="http://schemas.openxmlformats.org/markup-compatibility/2006" xmlns:p15="http://schemas.microsoft.com/office/powerpoint/2012/main">
+    <mc:Choice Requires="p15">
       <p:transition spd="med">
         <p15:prstTrans prst="drape"/>
       </p:transition>
     </mc:Choice>
-    <mc:Fallback>
+    <mc:Fallback xmlns="">
       <p:transition spd="med">
         <p:fade/>
       </p:transition>
@@ -16711,13 +16716,13 @@
   <p:clrMapOvr>
     <a:masterClrMapping/>
   </p:clrMapOvr>
-  <mc:AlternateContent xmlns:mc="http://schemas.openxmlformats.org/markup-compatibility/2006">
-    <mc:Choice xmlns:p15="http://schemas.microsoft.com/office/powerpoint/2012/main" Requires="p15">
+  <mc:AlternateContent xmlns:mc="http://schemas.openxmlformats.org/markup-compatibility/2006" xmlns:p15="http://schemas.microsoft.com/office/powerpoint/2012/main">
+    <mc:Choice Requires="p15">
       <p:transition spd="med">
         <p15:prstTrans prst="drape"/>
       </p:transition>
     </mc:Choice>
-    <mc:Fallback>
+    <mc:Fallback xmlns="">
       <p:transition spd="med">
         <p:fade/>
       </p:transition>
@@ -16862,13 +16867,13 @@
   <p:clrMapOvr>
     <a:masterClrMapping/>
   </p:clrMapOvr>
-  <mc:AlternateContent xmlns:mc="http://schemas.openxmlformats.org/markup-compatibility/2006">
-    <mc:Choice xmlns:p15="http://schemas.microsoft.com/office/powerpoint/2012/main" Requires="p15">
+  <mc:AlternateContent xmlns:mc="http://schemas.openxmlformats.org/markup-compatibility/2006" xmlns:p15="http://schemas.microsoft.com/office/powerpoint/2012/main">
+    <mc:Choice Requires="p15">
       <p:transition spd="med">
         <p15:prstTrans prst="drape"/>
       </p:transition>
     </mc:Choice>
-    <mc:Fallback>
+    <mc:Fallback xmlns="">
       <p:transition spd="med">
         <p:fade/>
       </p:transition>
@@ -16962,13 +16967,13 @@
   <p:clrMapOvr>
     <a:masterClrMapping/>
   </p:clrMapOvr>
-  <mc:AlternateContent xmlns:mc="http://schemas.openxmlformats.org/markup-compatibility/2006">
-    <mc:Choice xmlns:p15="http://schemas.microsoft.com/office/powerpoint/2012/main" Requires="p15">
+  <mc:AlternateContent xmlns:mc="http://schemas.openxmlformats.org/markup-compatibility/2006" xmlns:p15="http://schemas.microsoft.com/office/powerpoint/2012/main">
+    <mc:Choice Requires="p15">
       <p:transition spd="med">
         <p15:prstTrans prst="drape"/>
       </p:transition>
     </mc:Choice>
-    <mc:Fallback>
+    <mc:Fallback xmlns="">
       <p:transition spd="med">
         <p:fade/>
       </p:transition>
@@ -17062,13 +17067,13 @@
   <p:clrMapOvr>
     <a:masterClrMapping/>
   </p:clrMapOvr>
-  <mc:AlternateContent xmlns:mc="http://schemas.openxmlformats.org/markup-compatibility/2006">
-    <mc:Choice xmlns:p15="http://schemas.microsoft.com/office/powerpoint/2012/main" Requires="p15">
+  <mc:AlternateContent xmlns:mc="http://schemas.openxmlformats.org/markup-compatibility/2006" xmlns:p15="http://schemas.microsoft.com/office/powerpoint/2012/main">
+    <mc:Choice Requires="p15">
       <p:transition spd="med">
         <p15:prstTrans prst="drape"/>
       </p:transition>
     </mc:Choice>
-    <mc:Fallback>
+    <mc:Fallback xmlns="">
       <p:transition spd="med">
         <p:fade/>
       </p:transition>
@@ -17162,13 +17167,13 @@
   <p:clrMapOvr>
     <a:masterClrMapping/>
   </p:clrMapOvr>
-  <mc:AlternateContent xmlns:mc="http://schemas.openxmlformats.org/markup-compatibility/2006">
-    <mc:Choice xmlns:p15="http://schemas.microsoft.com/office/powerpoint/2012/main" Requires="p15">
+  <mc:AlternateContent xmlns:mc="http://schemas.openxmlformats.org/markup-compatibility/2006" xmlns:p15="http://schemas.microsoft.com/office/powerpoint/2012/main">
+    <mc:Choice Requires="p15">
       <p:transition spd="med">
         <p15:prstTrans prst="drape"/>
       </p:transition>
     </mc:Choice>
-    <mc:Fallback>
+    <mc:Fallback xmlns="">
       <p:transition spd="med">
         <p:fade/>
       </p:transition>
@@ -17262,13 +17267,13 @@
   <p:clrMapOvr>
     <a:masterClrMapping/>
   </p:clrMapOvr>
-  <mc:AlternateContent xmlns:mc="http://schemas.openxmlformats.org/markup-compatibility/2006">
-    <mc:Choice xmlns:p15="http://schemas.microsoft.com/office/powerpoint/2012/main" Requires="p15">
+  <mc:AlternateContent xmlns:mc="http://schemas.openxmlformats.org/markup-compatibility/2006" xmlns:p15="http://schemas.microsoft.com/office/powerpoint/2012/main">
+    <mc:Choice Requires="p15">
       <p:transition spd="med">
         <p15:prstTrans prst="drape"/>
       </p:transition>
     </mc:Choice>
-    <mc:Fallback>
+    <mc:Fallback xmlns="">
       <p:transition spd="med">
         <p:fade/>
       </p:transition>
@@ -17339,33 +17344,97 @@
             <p:ph idx="1"/>
           </p:nvPr>
         </p:nvSpPr>
-        <p:spPr/>
+        <p:spPr>
+          <a:xfrm>
+            <a:off x="1103312" y="1738184"/>
+            <a:ext cx="8946541" cy="4736757"/>
+          </a:xfrm>
+        </p:spPr>
         <p:txBody>
           <a:bodyPr>
-            <a:normAutofit fontScale="62500" lnSpcReduction="20000"/>
+            <a:noAutofit/>
           </a:bodyPr>
           <a:lstStyle/>
           <a:p>
-            <a:r>
-              <a:rPr lang="en-US" u="sng">
+            <a:pPr marL="342900" lvl="3" indent="-342900"/>
+            <a:r>
+              <a:rPr lang="en-US" sz="1600">
+                <a:latin typeface="Cambria" panose="02040503050406030204" pitchFamily="18" charset="0"/>
+              </a:rPr>
+              <a:t>Slide bài giảng môn học “Trí tuệ nhân tạo” của</a:t>
+            </a:r>
+            <a:br>
+              <a:rPr lang="en-US" sz="1600">
+                <a:latin typeface="Cambria" panose="02040503050406030204" pitchFamily="18" charset="0"/>
+              </a:rPr>
+            </a:br>
+            <a:r>
+              <a:rPr lang="en-US" sz="1600">
+                <a:latin typeface="Cambria" panose="02040503050406030204" pitchFamily="18" charset="0"/>
+              </a:rPr>
+              <a:t>Tiến sỹ Nguyễn Nhật Quang, giảng viên trường Đại học Bách Khoa Hà Nội.</a:t>
+            </a:r>
+          </a:p>
+          <a:p>
+            <a:r>
+              <a:rPr lang="en-US" sz="1600"/>
+              <a:t>Thư viện </a:t>
+            </a:r>
+            <a:r>
+              <a:rPr lang="en-US" sz="1600"/>
+              <a:t>Timer </a:t>
+            </a:r>
+            <a:r>
+              <a:rPr lang="en-US" sz="1600" smtClean="0"/>
+              <a:t>của </a:t>
+            </a:r>
+            <a:r>
+              <a:rPr lang="en-US" sz="1600"/>
+              <a:t/>
+            </a:r>
+            <a:br>
+              <a:rPr lang="en-US" sz="1600"/>
+            </a:br>
+            <a:r>
+              <a:rPr lang="en-US" sz="1600"/>
+              <a:t>Tiến sỹ Phạm Quang Dũng, giảng viên trường Đại học Bách Khoa Hà Nội</a:t>
+            </a:r>
+            <a:endParaRPr lang="en-US" sz="1600" u="sng" smtClean="0">
+              <a:solidFill>
+                <a:srgbClr val="00B0F0"/>
+              </a:solidFill>
+              <a:hlinkClick r:id="rId2"/>
+            </a:endParaRPr>
+          </a:p>
+          <a:p>
+            <a:endParaRPr lang="en-US" sz="1400" u="sng">
+              <a:solidFill>
+                <a:srgbClr val="00B0F0"/>
+              </a:solidFill>
+              <a:hlinkClick r:id="rId2"/>
+            </a:endParaRPr>
+          </a:p>
+          <a:p>
+            <a:r>
+              <a:rPr lang="en-US" sz="1400" u="sng" smtClean="0">
                 <a:solidFill>
                   <a:srgbClr val="00B0F0"/>
                 </a:solidFill>
                 <a:hlinkClick r:id="rId2"/>
               </a:rPr>
-              <a:t>http://heuristicswiki.wikispaces.com/N</a:t>
-            </a:r>
-            <a:r>
-              <a:rPr lang="en-US" u="sng">
+              <a:t>http</a:t>
+            </a:r>
+            <a:r>
+              <a:rPr lang="en-US" sz="1400" u="sng">
                 <a:solidFill>
                   <a:srgbClr val="00B0F0"/>
                 </a:solidFill>
                 <a:hlinkClick r:id="rId2"/>
               </a:rPr>
-              <a:t>+-+</a:t>
-            </a:r>
-            <a:r>
-              <a:rPr lang="en-US" u="sng" smtClean="0">
+              <a:t>://heuristicswiki.wikispaces.com/N+-+</a:t>
+            </a:r>
+            <a:r>
+              <a:rPr lang="en-US" sz="1400" u="sng" smtClean="0">
                 <a:solidFill>
                   <a:srgbClr val="00B0F0"/>
                 </a:solidFill>
@@ -17373,40 +17442,24 @@
               </a:rPr>
               <a:t>Puzzle</a:t>
             </a:r>
-            <a:endParaRPr lang="en-US" u="sng" smtClean="0">
+            <a:endParaRPr lang="en-US" sz="1400" u="sng">
               <a:solidFill>
                 <a:srgbClr val="00B0F0"/>
               </a:solidFill>
             </a:endParaRPr>
           </a:p>
           <a:p>
-            <a:endParaRPr lang="en-US" u="sng">
-              <a:solidFill>
-                <a:srgbClr val="00B0F0"/>
-              </a:solidFill>
-            </a:endParaRPr>
-          </a:p>
-          <a:p>
-            <a:r>
-              <a:rPr lang="en-US" u="sng">
+            <a:r>
+              <a:rPr lang="en-US" sz="1400" u="sng">
                 <a:solidFill>
                   <a:srgbClr val="00B0F0"/>
                 </a:solidFill>
                 <a:hlinkClick r:id="rId3"/>
               </a:rPr>
-              <a:t>http</a:t>
-            </a:r>
-            <a:r>
-              <a:rPr lang="en-US" u="sng">
-                <a:solidFill>
-                  <a:srgbClr val="00B0F0"/>
-                </a:solidFill>
-                <a:hlinkClick r:id="rId3"/>
-              </a:rPr>
-              <a:t>://</a:t>
-            </a:r>
-            <a:r>
-              <a:rPr lang="en-US" u="sng" smtClean="0">
+              <a:t>http://</a:t>
+            </a:r>
+            <a:r>
+              <a:rPr lang="en-US" sz="1400" u="sng" smtClean="0">
                 <a:solidFill>
                   <a:srgbClr val="00B0F0"/>
                 </a:solidFill>
@@ -17414,14 +17467,7 @@
               </a:rPr>
               <a:t>www.cs.unb.ca/profs/hzhang/CS4725/assignments/assgn2-06W-sol.htm</a:t>
             </a:r>
-            <a:endParaRPr lang="en-US">
-              <a:solidFill>
-                <a:srgbClr val="00B0F0"/>
-              </a:solidFill>
-            </a:endParaRPr>
-          </a:p>
-          <a:p>
-            <a:endParaRPr lang="en-US" u="sng">
+            <a:endParaRPr lang="en-US" sz="1400" u="sng">
               <a:solidFill>
                 <a:srgbClr val="00B0F0"/>
               </a:solidFill>
@@ -17430,7 +17476,7 @@
           </a:p>
           <a:p>
             <a:r>
-              <a:rPr lang="en-US" u="sng" smtClean="0">
+              <a:rPr lang="en-US" sz="1400" u="sng" smtClean="0">
                 <a:solidFill>
                   <a:srgbClr val="00B0F0"/>
                 </a:solidFill>
@@ -17439,7 +17485,7 @@
               <a:t>http</a:t>
             </a:r>
             <a:r>
-              <a:rPr lang="en-US" u="sng">
+              <a:rPr lang="en-US" sz="1400" u="sng">
                 <a:solidFill>
                   <a:srgbClr val="00B0F0"/>
                 </a:solidFill>
@@ -17448,7 +17494,7 @@
               <a:t>://</a:t>
             </a:r>
             <a:r>
-              <a:rPr lang="en-US" u="sng" smtClean="0">
+              <a:rPr lang="en-US" sz="1400" u="sng" smtClean="0">
                 <a:solidFill>
                   <a:srgbClr val="00B0F0"/>
                 </a:solidFill>
@@ -17456,14 +17502,14 @@
               </a:rPr>
               <a:t>ethesis.nitrkl.ac.in/5575/1/110CS0081-1.pdf</a:t>
             </a:r>
-            <a:endParaRPr lang="en-US">
+            <a:endParaRPr lang="en-US" sz="1400">
               <a:solidFill>
                 <a:srgbClr val="00B0F0"/>
               </a:solidFill>
             </a:endParaRPr>
           </a:p>
           <a:p>
-            <a:endParaRPr lang="en-US" u="sng">
+            <a:endParaRPr lang="en-US" sz="1400" u="sng">
               <a:solidFill>
                 <a:srgbClr val="00B0F0"/>
               </a:solidFill>
@@ -17472,7 +17518,7 @@
           </a:p>
           <a:p>
             <a:r>
-              <a:rPr lang="en-US" u="sng" smtClean="0">
+              <a:rPr lang="en-US" sz="1400" u="sng" smtClean="0">
                 <a:solidFill>
                   <a:srgbClr val="00B0F0"/>
                 </a:solidFill>
@@ -17481,25 +17527,16 @@
               <a:t>http</a:t>
             </a:r>
             <a:r>
-              <a:rPr lang="en-US" u="sng">
+              <a:rPr lang="en-US" sz="1400" u="sng">
                 <a:solidFill>
                   <a:srgbClr val="00B0F0"/>
                 </a:solidFill>
                 <a:hlinkClick r:id="rId5"/>
               </a:rPr>
-              <a:t>://disi.unitn.it</a:t>
-            </a:r>
-            <a:r>
-              <a:rPr lang="en-US" u="sng">
-                <a:solidFill>
-                  <a:srgbClr val="00B0F0"/>
-                </a:solidFill>
-                <a:hlinkClick r:id="rId5"/>
-              </a:rPr>
-              <a:t>/~</a:t>
-            </a:r>
-            <a:r>
-              <a:rPr lang="en-US" u="sng" smtClean="0">
+              <a:t>://disi.unitn.it/~</a:t>
+            </a:r>
+            <a:r>
+              <a:rPr lang="en-US" sz="1400" u="sng" smtClean="0">
                 <a:solidFill>
                   <a:srgbClr val="00B0F0"/>
                 </a:solidFill>
@@ -17507,7 +17544,7 @@
               </a:rPr>
               <a:t>montreso/asd/progetti/2007-08/progetto2/The_Manhattan_Pair_Distance_Heuristic_for_the_15-puzzle.pdf</a:t>
             </a:r>
-            <a:endParaRPr lang="en-US">
+            <a:endParaRPr lang="en-US" sz="1400">
               <a:solidFill>
                 <a:srgbClr val="00B0F0"/>
               </a:solidFill>
@@ -17515,7 +17552,7 @@
           </a:p>
           <a:p>
             <a:r>
-              <a:rPr lang="en-US" u="sng" smtClean="0">
+              <a:rPr lang="en-US" sz="1400" u="sng" smtClean="0">
                 <a:solidFill>
                   <a:srgbClr val="00B0F0"/>
                 </a:solidFill>
@@ -17524,7 +17561,7 @@
               <a:t>http</a:t>
             </a:r>
             <a:r>
-              <a:rPr lang="en-US" u="sng">
+              <a:rPr lang="en-US" sz="1400" u="sng">
                 <a:solidFill>
                   <a:srgbClr val="00B0F0"/>
                 </a:solidFill>
@@ -17533,7 +17570,7 @@
               <a:t>://cseweb.ucsd.edu/~ccalabro/essays/15_puzzle.pdf</a:t>
             </a:r>
             <a:r>
-              <a:rPr lang="en-US">
+              <a:rPr lang="en-US" sz="1400">
                 <a:solidFill>
                   <a:srgbClr val="00B0F0"/>
                 </a:solidFill>
@@ -17541,32 +17578,23 @@
               <a:t/>
             </a:r>
             <a:br>
-              <a:rPr lang="en-US">
+              <a:rPr lang="en-US" sz="1400">
                 <a:solidFill>
                   <a:srgbClr val="00B0F0"/>
                 </a:solidFill>
               </a:rPr>
             </a:br>
             <a:r>
-              <a:rPr lang="en-US" u="sng">
+              <a:rPr lang="en-US" sz="1400" u="sng">
                 <a:solidFill>
                   <a:srgbClr val="00B0F0"/>
                 </a:solidFill>
                 <a:hlinkClick r:id="rId7"/>
               </a:rPr>
-              <a:t>https</a:t>
-            </a:r>
-            <a:r>
-              <a:rPr lang="en-US" u="sng">
-                <a:solidFill>
-                  <a:srgbClr val="00B0F0"/>
-                </a:solidFill>
-                <a:hlinkClick r:id="rId7"/>
-              </a:rPr>
-              <a:t>://</a:t>
-            </a:r>
-            <a:r>
-              <a:rPr lang="en-US" u="sng" smtClean="0">
+              <a:t>https://</a:t>
+            </a:r>
+            <a:r>
+              <a:rPr lang="en-US" sz="1400" u="sng" smtClean="0">
                 <a:solidFill>
                   <a:srgbClr val="00B0F0"/>
                 </a:solidFill>
@@ -17574,7 +17602,7 @@
               </a:rPr>
               <a:t>www.scribd.com/fullscreen/103698298?access_key=key-anvyh6p0mh6yxt4pq40</a:t>
             </a:r>
-            <a:endParaRPr lang="en-US">
+            <a:endParaRPr lang="en-US" sz="1400">
               <a:solidFill>
                 <a:srgbClr val="00B0F0"/>
               </a:solidFill>
@@ -17582,7 +17610,7 @@
           </a:p>
           <a:p>
             <a:r>
-              <a:rPr lang="en-US" u="sng" smtClean="0">
+              <a:rPr lang="en-US" sz="1400" u="sng" smtClean="0">
                 <a:solidFill>
                   <a:srgbClr val="00B0F0"/>
                 </a:solidFill>
@@ -17591,25 +17619,16 @@
               <a:t>http</a:t>
             </a:r>
             <a:r>
-              <a:rPr lang="en-US" u="sng">
+              <a:rPr lang="en-US" sz="1400" u="sng">
                 <a:solidFill>
                   <a:srgbClr val="00B0F0"/>
                 </a:solidFill>
                 <a:hlinkClick r:id="rId8"/>
               </a:rPr>
-              <a:t>://ai.stanford.edu</a:t>
-            </a:r>
-            <a:r>
-              <a:rPr lang="en-US" u="sng">
-                <a:solidFill>
-                  <a:srgbClr val="00B0F0"/>
-                </a:solidFill>
-                <a:hlinkClick r:id="rId8"/>
-              </a:rPr>
-              <a:t>/~</a:t>
-            </a:r>
-            <a:r>
-              <a:rPr lang="en-US" u="sng" smtClean="0">
+              <a:t>://ai.stanford.edu/~</a:t>
+            </a:r>
+            <a:r>
+              <a:rPr lang="en-US" sz="1400" u="sng" smtClean="0">
                 <a:solidFill>
                   <a:srgbClr val="00B0F0"/>
                 </a:solidFill>
@@ -17617,7 +17636,7 @@
               </a:rPr>
               <a:t>latombe/cs121/2011/slides/D-heuristic-search.pdf</a:t>
             </a:r>
-            <a:endParaRPr lang="en-US">
+            <a:endParaRPr lang="en-US" sz="1400">
               <a:solidFill>
                 <a:srgbClr val="00B0F0"/>
               </a:solidFill>
@@ -17625,7 +17644,7 @@
           </a:p>
           <a:p>
             <a:r>
-              <a:rPr lang="en-US" u="sng" smtClean="0">
+              <a:rPr lang="en-US" sz="1400" u="sng" smtClean="0">
                 <a:solidFill>
                   <a:srgbClr val="00B0F0"/>
                 </a:solidFill>
@@ -17634,7 +17653,7 @@
               <a:t>https</a:t>
             </a:r>
             <a:r>
-              <a:rPr lang="en-US" u="sng">
+              <a:rPr lang="en-US" sz="1400" u="sng">
                 <a:solidFill>
                   <a:srgbClr val="00B0F0"/>
                 </a:solidFill>
@@ -17642,7 +17661,7 @@
               </a:rPr>
               <a:t>://www.cs.bham.ac.uk/~mdr/teaching/modules04/java2/TilesSolvability.html</a:t>
             </a:r>
-            <a:endParaRPr lang="en-US">
+            <a:endParaRPr lang="en-US" sz="1400">
               <a:solidFill>
                 <a:srgbClr val="00B0F0"/>
               </a:solidFill>
@@ -17660,13 +17679,13 @@
   <p:clrMapOvr>
     <a:masterClrMapping/>
   </p:clrMapOvr>
-  <mc:AlternateContent xmlns:mc="http://schemas.openxmlformats.org/markup-compatibility/2006">
-    <mc:Choice xmlns:p15="http://schemas.microsoft.com/office/powerpoint/2012/main" Requires="p15">
+  <mc:AlternateContent xmlns:mc="http://schemas.openxmlformats.org/markup-compatibility/2006" xmlns:p15="http://schemas.microsoft.com/office/powerpoint/2012/main">
+    <mc:Choice Requires="p15">
       <p:transition spd="med">
         <p15:prstTrans prst="drape"/>
       </p:transition>
     </mc:Choice>
-    <mc:Fallback>
+    <mc:Fallback xmlns="">
       <p:transition spd="med">
         <p:fade/>
       </p:transition>
@@ -17808,13 +17827,13 @@
   <p:clrMapOvr>
     <a:masterClrMapping/>
   </p:clrMapOvr>
-  <mc:AlternateContent xmlns:mc="http://schemas.openxmlformats.org/markup-compatibility/2006">
-    <mc:Choice xmlns:p15="http://schemas.microsoft.com/office/powerpoint/2012/main" Requires="p15">
+  <mc:AlternateContent xmlns:mc="http://schemas.openxmlformats.org/markup-compatibility/2006" xmlns:p15="http://schemas.microsoft.com/office/powerpoint/2012/main">
+    <mc:Choice Requires="p15">
       <p:transition spd="med">
         <p15:prstTrans prst="drape"/>
       </p:transition>
     </mc:Choice>
-    <mc:Fallback>
+    <mc:Fallback xmlns="">
       <p:transition spd="med">
         <p:fade/>
       </p:transition>
@@ -17999,13 +18018,13 @@
   <p:clrMapOvr>
     <a:masterClrMapping/>
   </p:clrMapOvr>
-  <mc:AlternateContent xmlns:mc="http://schemas.openxmlformats.org/markup-compatibility/2006">
-    <mc:Choice xmlns:p15="http://schemas.microsoft.com/office/powerpoint/2012/main" Requires="p15">
+  <mc:AlternateContent xmlns:mc="http://schemas.openxmlformats.org/markup-compatibility/2006" xmlns:p15="http://schemas.microsoft.com/office/powerpoint/2012/main">
+    <mc:Choice Requires="p15">
       <p:transition spd="med">
         <p15:prstTrans prst="drape"/>
       </p:transition>
     </mc:Choice>
-    <mc:Fallback>
+    <mc:Fallback xmlns="">
       <p:transition spd="med">
         <p:fade/>
       </p:transition>
@@ -18163,13 +18182,13 @@
   <p:clrMapOvr>
     <a:masterClrMapping/>
   </p:clrMapOvr>
-  <mc:AlternateContent xmlns:mc="http://schemas.openxmlformats.org/markup-compatibility/2006">
-    <mc:Choice xmlns:p15="http://schemas.microsoft.com/office/powerpoint/2012/main" Requires="p15">
+  <mc:AlternateContent xmlns:mc="http://schemas.openxmlformats.org/markup-compatibility/2006" xmlns:p15="http://schemas.microsoft.com/office/powerpoint/2012/main">
+    <mc:Choice Requires="p15">
       <p:transition spd="med">
         <p15:prstTrans prst="drape"/>
       </p:transition>
     </mc:Choice>
-    <mc:Fallback>
+    <mc:Fallback xmlns="">
       <p:transition spd="med">
         <p:fade/>
       </p:transition>
@@ -18346,13 +18365,13 @@
   <p:clrMapOvr>
     <a:masterClrMapping/>
   </p:clrMapOvr>
-  <mc:AlternateContent xmlns:mc="http://schemas.openxmlformats.org/markup-compatibility/2006">
-    <mc:Choice xmlns:p15="http://schemas.microsoft.com/office/powerpoint/2012/main" Requires="p15">
+  <mc:AlternateContent xmlns:mc="http://schemas.openxmlformats.org/markup-compatibility/2006" xmlns:p15="http://schemas.microsoft.com/office/powerpoint/2012/main">
+    <mc:Choice Requires="p15">
       <p:transition spd="med">
         <p15:prstTrans prst="drape"/>
       </p:transition>
     </mc:Choice>
-    <mc:Fallback>
+    <mc:Fallback xmlns="">
       <p:transition spd="med">
         <p:fade/>
       </p:transition>
@@ -18509,13 +18528,13 @@
   <p:clrMapOvr>
     <a:masterClrMapping/>
   </p:clrMapOvr>
-  <mc:AlternateContent xmlns:mc="http://schemas.openxmlformats.org/markup-compatibility/2006">
-    <mc:Choice xmlns:p15="http://schemas.microsoft.com/office/powerpoint/2012/main" Requires="p15">
+  <mc:AlternateContent xmlns:mc="http://schemas.openxmlformats.org/markup-compatibility/2006" xmlns:p15="http://schemas.microsoft.com/office/powerpoint/2012/main">
+    <mc:Choice Requires="p15">
       <p:transition spd="med">
         <p15:prstTrans prst="drape"/>
       </p:transition>
     </mc:Choice>
-    <mc:Fallback>
+    <mc:Fallback xmlns="">
       <p:transition spd="med">
         <p:fade/>
       </p:transition>
@@ -18668,13 +18687,13 @@
   <p:clrMapOvr>
     <a:masterClrMapping/>
   </p:clrMapOvr>
-  <mc:AlternateContent xmlns:mc="http://schemas.openxmlformats.org/markup-compatibility/2006">
-    <mc:Choice xmlns:p15="http://schemas.microsoft.com/office/powerpoint/2012/main" Requires="p15">
+  <mc:AlternateContent xmlns:mc="http://schemas.openxmlformats.org/markup-compatibility/2006" xmlns:p15="http://schemas.microsoft.com/office/powerpoint/2012/main">
+    <mc:Choice Requires="p15">
       <p:transition spd="med">
         <p15:prstTrans prst="drape"/>
       </p:transition>
     </mc:Choice>
-    <mc:Fallback>
+    <mc:Fallback xmlns="">
       <p:transition spd="med">
         <p:fade/>
       </p:transition>
@@ -18881,13 +18900,13 @@
   <p:clrMapOvr>
     <a:masterClrMapping/>
   </p:clrMapOvr>
-  <mc:AlternateContent xmlns:mc="http://schemas.openxmlformats.org/markup-compatibility/2006">
-    <mc:Choice xmlns:p15="http://schemas.microsoft.com/office/powerpoint/2012/main" Requires="p15">
+  <mc:AlternateContent xmlns:mc="http://schemas.openxmlformats.org/markup-compatibility/2006" xmlns:p15="http://schemas.microsoft.com/office/powerpoint/2012/main">
+    <mc:Choice Requires="p15">
       <p:transition spd="med">
         <p15:prstTrans prst="drape"/>
       </p:transition>
     </mc:Choice>
-    <mc:Fallback>
+    <mc:Fallback xmlns="">
       <p:transition spd="med">
         <p:fade/>
       </p:transition>

</xml_diff>